<commit_message>
Fix ui diagarm and Add table view
</commit_message>
<xml_diff>
--- a/docs/diagrams/UiComponentClassDiagram.pptx
+++ b/docs/diagrams/UiComponentClassDiagram.pptx
@@ -3450,8 +3450,8 @@
         </p:nvSpPr>
         <p:spPr>
           <a:xfrm>
-            <a:off x="1217465" y="1447799"/>
-            <a:ext cx="4917083" cy="5257797"/>
+            <a:off x="1184926" y="101772"/>
+            <a:ext cx="6301919" cy="7365828"/>
           </a:xfrm>
           <a:prstGeom prst="roundRect">
             <a:avLst>
@@ -3512,7 +3512,7 @@
         </p:nvSpPr>
         <p:spPr>
           <a:xfrm>
-            <a:off x="2095948" y="2341220"/>
+            <a:off x="2250083" y="1045821"/>
             <a:ext cx="1093635" cy="346760"/>
           </a:xfrm>
           <a:prstGeom prst="rect">
@@ -3572,7 +3572,7 @@
         </p:nvSpPr>
         <p:spPr>
           <a:xfrm>
-            <a:off x="2592528" y="2971800"/>
+            <a:off x="2746663" y="1676401"/>
             <a:ext cx="1093635" cy="236841"/>
           </a:xfrm>
           <a:prstGeom prst="rect">
@@ -3632,7 +3632,7 @@
         </p:nvSpPr>
         <p:spPr>
           <a:xfrm>
-            <a:off x="2092842" y="1770924"/>
+            <a:off x="2246977" y="475525"/>
             <a:ext cx="1093635" cy="346760"/>
           </a:xfrm>
           <a:prstGeom prst="rect">
@@ -3694,7 +3694,7 @@
         </p:nvCxnSpPr>
         <p:spPr>
           <a:xfrm rot="16200000" flipH="1">
-            <a:off x="2529445" y="2227899"/>
+            <a:off x="2683580" y="932500"/>
             <a:ext cx="223536" cy="3106"/>
           </a:xfrm>
           <a:prstGeom prst="bentConnector3">
@@ -3734,7 +3734,7 @@
         </p:nvSpPr>
         <p:spPr>
           <a:xfrm rot="10800000" flipV="1">
-            <a:off x="5394717" y="2110477"/>
+            <a:off x="5548852" y="815078"/>
             <a:ext cx="270504" cy="175523"/>
           </a:xfrm>
           <a:prstGeom prst="triangle">
@@ -3782,7 +3782,7 @@
         </p:nvCxnSpPr>
         <p:spPr>
           <a:xfrm flipV="1">
-            <a:off x="644735" y="2991937"/>
+            <a:off x="798870" y="1696538"/>
             <a:ext cx="684904" cy="1"/>
           </a:xfrm>
           <a:prstGeom prst="bentConnector3">
@@ -3825,7 +3825,7 @@
         </p:nvSpPr>
         <p:spPr>
           <a:xfrm rot="16200000">
-            <a:off x="5703829" y="2464877"/>
+            <a:off x="5857964" y="1169478"/>
             <a:ext cx="2362201" cy="328045"/>
           </a:xfrm>
           <a:prstGeom prst="roundRect">
@@ -3885,7 +3885,7 @@
         </p:nvSpPr>
         <p:spPr>
           <a:xfrm>
-            <a:off x="2592528" y="3649359"/>
+            <a:off x="2746663" y="2353960"/>
             <a:ext cx="1093635" cy="236841"/>
           </a:xfrm>
           <a:prstGeom prst="rect">
@@ -3945,7 +3945,7 @@
         </p:nvSpPr>
         <p:spPr>
           <a:xfrm>
-            <a:off x="2592527" y="5914118"/>
+            <a:off x="2746662" y="6599918"/>
             <a:ext cx="1093635" cy="236841"/>
           </a:xfrm>
           <a:prstGeom prst="rect">
@@ -4005,7 +4005,7 @@
         </p:nvSpPr>
         <p:spPr>
           <a:xfrm>
-            <a:off x="2592526" y="3991960"/>
+            <a:off x="2746661" y="4068161"/>
             <a:ext cx="1093635" cy="236841"/>
           </a:xfrm>
           <a:prstGeom prst="rect">
@@ -4045,7 +4045,7 @@
                   </a:schemeClr>
                 </a:solidFill>
               </a:rPr>
-              <a:t>ListPanel</a:t>
+              <a:t>ItemListPanel</a:t>
             </a:r>
             <a:endParaRPr lang="en-SG" sz="1050" b="1" dirty="0">
               <a:solidFill>
@@ -4065,7 +4065,7 @@
         </p:nvSpPr>
         <p:spPr>
           <a:xfrm>
-            <a:off x="3839323" y="4228801"/>
+            <a:off x="3993458" y="4305001"/>
             <a:ext cx="1040906" cy="236841"/>
           </a:xfrm>
           <a:prstGeom prst="rect">
@@ -4125,7 +4125,7 @@
         </p:nvSpPr>
         <p:spPr>
           <a:xfrm>
-            <a:off x="2592528" y="6316359"/>
+            <a:off x="2746663" y="7002159"/>
             <a:ext cx="1093635" cy="236841"/>
           </a:xfrm>
           <a:prstGeom prst="rect">
@@ -4185,7 +4185,7 @@
         </p:nvSpPr>
         <p:spPr>
           <a:xfrm>
-            <a:off x="2324548" y="2706452"/>
+            <a:off x="2478683" y="1411053"/>
             <a:ext cx="183156" cy="161573"/>
           </a:xfrm>
           <a:prstGeom prst="flowChartDecision">
@@ -4236,7 +4236,7 @@
         </p:nvCxnSpPr>
         <p:spPr>
           <a:xfrm rot="16200000" flipH="1">
-            <a:off x="2393229" y="2890922"/>
+            <a:off x="2547364" y="1595523"/>
             <a:ext cx="222196" cy="176402"/>
           </a:xfrm>
           <a:prstGeom prst="bentConnector2">
@@ -4274,7 +4274,7 @@
         </p:nvSpPr>
         <p:spPr>
           <a:xfrm>
-            <a:off x="2590799" y="3304308"/>
+            <a:off x="2744934" y="2008909"/>
             <a:ext cx="1095361" cy="236841"/>
           </a:xfrm>
           <a:prstGeom prst="rect">
@@ -4337,7 +4337,7 @@
         </p:nvCxnSpPr>
         <p:spPr>
           <a:xfrm rot="16200000" flipH="1">
-            <a:off x="2054450" y="3229701"/>
+            <a:off x="2208585" y="1934302"/>
             <a:ext cx="899755" cy="176402"/>
           </a:xfrm>
           <a:prstGeom prst="bentConnector2">
@@ -4378,8 +4378,8 @@
         </p:nvCxnSpPr>
         <p:spPr>
           <a:xfrm rot="16200000" flipH="1">
-            <a:off x="1883148" y="3401003"/>
-            <a:ext cx="1242356" cy="176400"/>
+            <a:off x="1351483" y="2791404"/>
+            <a:ext cx="2613956" cy="176400"/>
           </a:xfrm>
           <a:prstGeom prst="bentConnector2">
             <a:avLst/>
@@ -4419,8 +4419,8 @@
         </p:nvCxnSpPr>
         <p:spPr>
           <a:xfrm rot="16200000" flipH="1">
-            <a:off x="922069" y="4362081"/>
-            <a:ext cx="3164514" cy="176401"/>
+            <a:off x="85605" y="4057281"/>
+            <a:ext cx="5145713" cy="176401"/>
           </a:xfrm>
           <a:prstGeom prst="bentConnector2">
             <a:avLst/>
@@ -4460,8 +4460,8 @@
         </p:nvCxnSpPr>
         <p:spPr>
           <a:xfrm rot="16200000" flipH="1">
-            <a:off x="505368" y="4347620"/>
-            <a:ext cx="3754770" cy="419550"/>
+            <a:off x="-324851" y="4049065"/>
+            <a:ext cx="5727999" cy="415029"/>
           </a:xfrm>
           <a:prstGeom prst="bentConnector2">
             <a:avLst/>
@@ -4498,7 +4498,7 @@
         </p:nvSpPr>
         <p:spPr>
           <a:xfrm>
-            <a:off x="5143948" y="1770924"/>
+            <a:off x="5298083" y="475525"/>
             <a:ext cx="772043" cy="346760"/>
           </a:xfrm>
           <a:prstGeom prst="rect">
@@ -4580,7 +4580,7 @@
         </p:nvCxnSpPr>
         <p:spPr>
           <a:xfrm flipV="1">
-            <a:off x="3686160" y="2286000"/>
+            <a:off x="3840295" y="990601"/>
             <a:ext cx="1843809" cy="1136729"/>
           </a:xfrm>
           <a:prstGeom prst="bentConnector2">
@@ -4621,8 +4621,8 @@
         </p:nvCxnSpPr>
         <p:spPr>
           <a:xfrm rot="5400000">
-            <a:off x="4174488" y="2991741"/>
-            <a:ext cx="2061222" cy="649740"/>
+            <a:off x="3642824" y="2382141"/>
+            <a:ext cx="3432821" cy="649740"/>
           </a:xfrm>
           <a:prstGeom prst="bentConnector2">
             <a:avLst/>
@@ -4662,7 +4662,7 @@
         </p:nvCxnSpPr>
         <p:spPr>
           <a:xfrm rot="5400000">
-            <a:off x="3867176" y="2104987"/>
+            <a:off x="4021311" y="809588"/>
             <a:ext cx="1481780" cy="1843806"/>
           </a:xfrm>
           <a:prstGeom prst="bentConnector2">
@@ -4703,7 +4703,7 @@
         </p:nvCxnSpPr>
         <p:spPr>
           <a:xfrm flipV="1">
-            <a:off x="3189583" y="2286000"/>
+            <a:off x="3343718" y="990601"/>
             <a:ext cx="2340386" cy="228600"/>
           </a:xfrm>
           <a:prstGeom prst="bentConnector2">
@@ -4744,8 +4744,8 @@
         </p:nvCxnSpPr>
         <p:spPr>
           <a:xfrm rot="5400000">
-            <a:off x="2734797" y="3237366"/>
-            <a:ext cx="3746539" cy="1843807"/>
+            <a:off x="1898332" y="2932567"/>
+            <a:ext cx="5727738" cy="1843807"/>
           </a:xfrm>
           <a:prstGeom prst="bentConnector2">
             <a:avLst/>
@@ -4786,8 +4786,8 @@
         </p:nvCxnSpPr>
         <p:spPr>
           <a:xfrm rot="5400000">
-            <a:off x="2533676" y="3438487"/>
-            <a:ext cx="4148780" cy="1843806"/>
+            <a:off x="1697212" y="3133687"/>
+            <a:ext cx="6129979" cy="1843806"/>
           </a:xfrm>
           <a:prstGeom prst="bentConnector2">
             <a:avLst/>
@@ -4826,7 +4826,7 @@
         </p:nvCxnSpPr>
         <p:spPr>
           <a:xfrm rot="5400000" flipH="1" flipV="1">
-            <a:off x="4594921" y="-355061"/>
+            <a:off x="4749056" y="-1650460"/>
             <a:ext cx="170724" cy="4081246"/>
           </a:xfrm>
           <a:prstGeom prst="bentConnector2">
@@ -4865,8 +4865,8 @@
         </p:nvSpPr>
         <p:spPr>
           <a:xfrm rot="16200000">
-            <a:off x="5902568" y="4871545"/>
-            <a:ext cx="1993941" cy="328045"/>
+            <a:off x="4996273" y="4636575"/>
+            <a:ext cx="4114802" cy="328045"/>
           </a:xfrm>
           <a:prstGeom prst="roundRect">
             <a:avLst/>
@@ -4925,7 +4925,7 @@
         </p:nvSpPr>
         <p:spPr>
           <a:xfrm rot="16200000">
-            <a:off x="956202" y="2861202"/>
+            <a:off x="1110337" y="1565803"/>
             <a:ext cx="1093635" cy="346760"/>
           </a:xfrm>
           <a:prstGeom prst="rect">
@@ -4995,7 +4995,7 @@
         </p:nvSpPr>
         <p:spPr>
           <a:xfrm flipV="1">
-            <a:off x="1367767" y="2286001"/>
+            <a:off x="1521902" y="990602"/>
             <a:ext cx="270504" cy="175523"/>
           </a:xfrm>
           <a:prstGeom prst="triangle">
@@ -5046,7 +5046,7 @@
         </p:nvCxnSpPr>
         <p:spPr>
           <a:xfrm rot="10800000" flipV="1">
-            <a:off x="1503020" y="1944303"/>
+            <a:off x="1657155" y="648904"/>
             <a:ext cx="589823" cy="341697"/>
           </a:xfrm>
           <a:prstGeom prst="bentConnector2">
@@ -5088,7 +5088,7 @@
         </p:nvCxnSpPr>
         <p:spPr>
           <a:xfrm rot="16200000" flipH="1">
-            <a:off x="2226110" y="3058040"/>
+            <a:off x="2380245" y="1762641"/>
             <a:ext cx="554704" cy="174673"/>
           </a:xfrm>
           <a:prstGeom prst="bentConnector2">
@@ -5129,7 +5129,7 @@
         </p:nvCxnSpPr>
         <p:spPr>
           <a:xfrm rot="5400000">
-            <a:off x="4205956" y="1766207"/>
+            <a:off x="4360091" y="470808"/>
             <a:ext cx="804221" cy="1843806"/>
           </a:xfrm>
           <a:prstGeom prst="bentConnector2">
@@ -5163,14 +5163,14 @@
         <p:nvCxnSpPr>
           <p:cNvPr id="137" name="Elbow Connector 136"/>
           <p:cNvCxnSpPr>
-            <a:stCxn id="36" idx="2"/>
+            <a:cxnSpLocks/>
             <a:endCxn id="37" idx="1"/>
           </p:cNvCxnSpPr>
           <p:nvPr/>
         </p:nvCxnSpPr>
         <p:spPr>
           <a:xfrm rot="16200000" flipH="1">
-            <a:off x="3430123" y="3938021"/>
+            <a:off x="3584258" y="4014221"/>
             <a:ext cx="118421" cy="699979"/>
           </a:xfrm>
           <a:prstGeom prst="bentConnector2">
@@ -5212,8 +5212,8 @@
         </p:nvCxnSpPr>
         <p:spPr>
           <a:xfrm rot="5400000">
-            <a:off x="3695875" y="2276286"/>
-            <a:ext cx="1824381" cy="1843808"/>
+            <a:off x="3164210" y="1666687"/>
+            <a:ext cx="3195981" cy="1843808"/>
           </a:xfrm>
           <a:prstGeom prst="bentConnector2">
             <a:avLst/>
@@ -5250,7 +5250,7 @@
         </p:nvSpPr>
         <p:spPr>
           <a:xfrm>
-            <a:off x="5435896" y="2743200"/>
+            <a:off x="5590031" y="1447801"/>
             <a:ext cx="229325" cy="166560"/>
           </a:xfrm>
           <a:prstGeom prst="rect">
@@ -5303,7 +5303,7 @@
         </p:nvSpPr>
         <p:spPr>
           <a:xfrm>
-            <a:off x="3687515" y="2828802"/>
+            <a:off x="3841650" y="1533403"/>
             <a:ext cx="3048000" cy="203200"/>
           </a:xfrm>
           <a:custGeom>
@@ -5385,7 +5385,7 @@
         </p:nvSpPr>
         <p:spPr>
           <a:xfrm>
-            <a:off x="5431573" y="4488138"/>
+            <a:off x="5585708" y="4564338"/>
             <a:ext cx="229325" cy="160062"/>
           </a:xfrm>
           <a:prstGeom prst="rect">
@@ -5438,7 +5438,7 @@
         </p:nvSpPr>
         <p:spPr>
           <a:xfrm flipV="1">
-            <a:off x="4114799" y="4472708"/>
+            <a:off x="4268934" y="4548909"/>
             <a:ext cx="2642195" cy="101600"/>
           </a:xfrm>
           <a:custGeom>
@@ -5526,7 +5526,7 @@
         </p:nvSpPr>
         <p:spPr>
           <a:xfrm>
-            <a:off x="3834999" y="4622811"/>
+            <a:off x="3989134" y="4912292"/>
             <a:ext cx="1040906" cy="236841"/>
           </a:xfrm>
           <a:prstGeom prst="rect">
@@ -5594,7 +5594,7 @@
         </p:nvCxnSpPr>
         <p:spPr>
           <a:xfrm rot="5400000">
-            <a:off x="4170164" y="3385751"/>
+            <a:off x="4324299" y="3675232"/>
             <a:ext cx="2061222" cy="649740"/>
           </a:xfrm>
           <a:prstGeom prst="bentConnector2">
@@ -5635,14 +5635,15 @@
           </p:cNvPr>
           <p:cNvCxnSpPr>
             <a:cxnSpLocks/>
-            <a:stCxn id="36" idx="2"/>
+            <a:stCxn id="64" idx="2"/>
+            <a:endCxn id="51" idx="1"/>
           </p:cNvCxnSpPr>
           <p:nvPr/>
         </p:nvCxnSpPr>
         <p:spPr>
           <a:xfrm rot="16200000" flipH="1">
-            <a:off x="3223384" y="4144761"/>
-            <a:ext cx="512430" cy="680510"/>
+            <a:off x="3568883" y="4610461"/>
+            <a:ext cx="153913" cy="686589"/>
           </a:xfrm>
           <a:prstGeom prst="bentConnector2">
             <a:avLst/>
@@ -5685,7 +5686,7 @@
         </p:nvSpPr>
         <p:spPr>
           <a:xfrm flipV="1">
-            <a:off x="4110475" y="4866718"/>
+            <a:off x="4264610" y="5156200"/>
             <a:ext cx="2642195" cy="101600"/>
           </a:xfrm>
           <a:custGeom>
@@ -5773,7 +5774,7 @@
         </p:nvSpPr>
         <p:spPr>
           <a:xfrm>
-            <a:off x="3831633" y="5070735"/>
+            <a:off x="3985768" y="5524201"/>
             <a:ext cx="1040906" cy="236841"/>
           </a:xfrm>
           <a:prstGeom prst="rect">
@@ -5841,7 +5842,7 @@
         </p:nvCxnSpPr>
         <p:spPr>
           <a:xfrm rot="5400000">
-            <a:off x="4166798" y="3833675"/>
+            <a:off x="4320933" y="4287141"/>
             <a:ext cx="2061222" cy="649740"/>
           </a:xfrm>
           <a:prstGeom prst="bentConnector2">
@@ -5882,15 +5883,15 @@
           </p:cNvPr>
           <p:cNvCxnSpPr>
             <a:cxnSpLocks/>
-            <a:stCxn id="36" idx="2"/>
+            <a:stCxn id="67" idx="2"/>
             <a:endCxn id="56" idx="1"/>
           </p:cNvCxnSpPr>
           <p:nvPr/>
         </p:nvCxnSpPr>
         <p:spPr>
           <a:xfrm rot="16200000" flipH="1">
-            <a:off x="3005311" y="4362833"/>
-            <a:ext cx="960355" cy="692289"/>
+            <a:off x="3570341" y="5227194"/>
+            <a:ext cx="147631" cy="683223"/>
           </a:xfrm>
           <a:prstGeom prst="bentConnector2">
             <a:avLst/>
@@ -5933,7 +5934,7 @@
         </p:nvSpPr>
         <p:spPr>
           <a:xfrm flipV="1">
-            <a:off x="4107109" y="5314642"/>
+            <a:off x="4261244" y="5768109"/>
             <a:ext cx="2642195" cy="101600"/>
           </a:xfrm>
           <a:custGeom>
@@ -6021,7 +6022,7 @@
         </p:nvSpPr>
         <p:spPr>
           <a:xfrm>
-            <a:off x="3839322" y="5487561"/>
+            <a:off x="3993457" y="6207692"/>
             <a:ext cx="1304625" cy="236841"/>
           </a:xfrm>
           <a:prstGeom prst="rect">
@@ -6090,7 +6091,7 @@
         </p:nvCxnSpPr>
         <p:spPr>
           <a:xfrm rot="5400000">
-            <a:off x="4306347" y="4382360"/>
+            <a:off x="4460482" y="5102491"/>
             <a:ext cx="2061222" cy="386022"/>
           </a:xfrm>
           <a:prstGeom prst="bentConnector2">
@@ -6131,15 +6132,15 @@
           </p:cNvPr>
           <p:cNvCxnSpPr>
             <a:cxnSpLocks/>
-            <a:stCxn id="36" idx="2"/>
+            <a:stCxn id="75" idx="2"/>
             <a:endCxn id="60" idx="1"/>
           </p:cNvCxnSpPr>
           <p:nvPr/>
         </p:nvCxnSpPr>
         <p:spPr>
           <a:xfrm rot="16200000" flipH="1">
-            <a:off x="2800743" y="4567402"/>
-            <a:ext cx="1377181" cy="699978"/>
+            <a:off x="3643489" y="5976145"/>
+            <a:ext cx="212954" cy="486981"/>
           </a:xfrm>
           <a:prstGeom prst="bentConnector2">
             <a:avLst/>
@@ -6182,7 +6183,7 @@
         </p:nvSpPr>
         <p:spPr>
           <a:xfrm flipV="1">
-            <a:off x="4114799" y="5731468"/>
+            <a:off x="4268934" y="6451600"/>
             <a:ext cx="2642195" cy="101600"/>
           </a:xfrm>
           <a:custGeom>
@@ -6245,6 +6246,1905 @@
           </a:effectRef>
           <a:fontRef idx="minor">
             <a:schemeClr val="dk1"/>
+          </a:fontRef>
+        </p:style>
+        <p:txBody>
+          <a:bodyPr rtlCol="0" anchor="ctr"/>
+          <a:lstStyle/>
+          <a:p>
+            <a:pPr algn="ctr"/>
+            <a:endParaRPr lang="en-SG"/>
+          </a:p>
+        </p:txBody>
+      </p:sp>
+      <p:sp>
+        <p:nvSpPr>
+          <p:cNvPr id="64" name="Rectangle 11">
+            <a:extLst>
+              <a:ext uri="{FF2B5EF4-FFF2-40B4-BE49-F238E27FC236}">
+                <a16:creationId xmlns:a16="http://schemas.microsoft.com/office/drawing/2014/main" id="{5BA7D512-E028-449F-A4B3-056DCD5850B6}"/>
+              </a:ext>
+            </a:extLst>
+          </p:cNvPr>
+          <p:cNvSpPr/>
+          <p:nvPr/>
+        </p:nvSpPr>
+        <p:spPr>
+          <a:xfrm>
+            <a:off x="2755727" y="4639959"/>
+            <a:ext cx="1093635" cy="236841"/>
+          </a:xfrm>
+          <a:prstGeom prst="rect">
+            <a:avLst/>
+          </a:prstGeom>
+          <a:ln w="19050">
+            <a:solidFill>
+              <a:schemeClr val="accent3"/>
+            </a:solidFill>
+          </a:ln>
+          <a:effectLst/>
+        </p:spPr>
+        <p:style>
+          <a:lnRef idx="1">
+            <a:schemeClr val="accent3"/>
+          </a:lnRef>
+          <a:fillRef idx="2">
+            <a:schemeClr val="accent3"/>
+          </a:fillRef>
+          <a:effectRef idx="1">
+            <a:schemeClr val="accent3"/>
+          </a:effectRef>
+          <a:fontRef idx="minor">
+            <a:schemeClr val="dk1"/>
+          </a:fontRef>
+        </p:style>
+        <p:txBody>
+          <a:bodyPr rtlCol="0" anchor="ctr"/>
+          <a:lstStyle/>
+          <a:p>
+            <a:pPr algn="ctr"/>
+            <a:r>
+              <a:rPr lang="en-US" sz="1050" b="1" dirty="0" err="1">
+                <a:solidFill>
+                  <a:schemeClr val="accent3">
+                    <a:lumMod val="75000"/>
+                  </a:schemeClr>
+                </a:solidFill>
+              </a:rPr>
+              <a:t>SaleListPanel</a:t>
+            </a:r>
+            <a:endParaRPr lang="en-SG" sz="1050" b="1" dirty="0">
+              <a:solidFill>
+                <a:schemeClr val="accent3">
+                  <a:lumMod val="75000"/>
+                </a:schemeClr>
+              </a:solidFill>
+            </a:endParaRPr>
+          </a:p>
+        </p:txBody>
+      </p:sp>
+      <p:cxnSp>
+        <p:nvCxnSpPr>
+          <p:cNvPr id="65" name="Elbow Connector 63">
+            <a:extLst>
+              <a:ext uri="{FF2B5EF4-FFF2-40B4-BE49-F238E27FC236}">
+                <a16:creationId xmlns:a16="http://schemas.microsoft.com/office/drawing/2014/main" id="{1D86160D-4548-4F6B-85EF-665B081B57BA}"/>
+              </a:ext>
+            </a:extLst>
+          </p:cNvPr>
+          <p:cNvCxnSpPr>
+            <a:cxnSpLocks/>
+            <a:stCxn id="39" idx="2"/>
+            <a:endCxn id="64" idx="1"/>
+          </p:cNvCxnSpPr>
+          <p:nvPr/>
+        </p:nvCxnSpPr>
+        <p:spPr>
+          <a:xfrm rot="16200000" flipH="1">
+            <a:off x="1070117" y="3072770"/>
+            <a:ext cx="3185754" cy="185466"/>
+          </a:xfrm>
+          <a:prstGeom prst="bentConnector2">
+            <a:avLst/>
+          </a:prstGeom>
+          <a:ln w="19050">
+            <a:solidFill>
+              <a:schemeClr val="accent3"/>
+            </a:solidFill>
+            <a:headEnd type="none" w="med" len="med"/>
+            <a:tailEnd type="arrow" w="med" len="med"/>
+          </a:ln>
+          <a:effectLst/>
+        </p:spPr>
+        <p:style>
+          <a:lnRef idx="1">
+            <a:schemeClr val="accent2"/>
+          </a:lnRef>
+          <a:fillRef idx="2">
+            <a:schemeClr val="accent2"/>
+          </a:fillRef>
+          <a:effectRef idx="1">
+            <a:schemeClr val="accent2"/>
+          </a:effectRef>
+          <a:fontRef idx="minor">
+            <a:schemeClr val="dk1"/>
+          </a:fontRef>
+        </p:style>
+      </p:cxnSp>
+      <p:cxnSp>
+        <p:nvCxnSpPr>
+          <p:cNvPr id="66" name="Elbow Connector 63">
+            <a:extLst>
+              <a:ext uri="{FF2B5EF4-FFF2-40B4-BE49-F238E27FC236}">
+                <a16:creationId xmlns:a16="http://schemas.microsoft.com/office/drawing/2014/main" id="{D006A39F-F1F6-46C0-AB2F-058A06594364}"/>
+              </a:ext>
+            </a:extLst>
+          </p:cNvPr>
+          <p:cNvCxnSpPr>
+            <a:cxnSpLocks/>
+            <a:stCxn id="16" idx="3"/>
+            <a:endCxn id="64" idx="3"/>
+          </p:cNvCxnSpPr>
+          <p:nvPr/>
+        </p:nvCxnSpPr>
+        <p:spPr>
+          <a:xfrm rot="5400000">
+            <a:off x="2882844" y="1957119"/>
+            <a:ext cx="3767779" cy="1834742"/>
+          </a:xfrm>
+          <a:prstGeom prst="bentConnector2">
+            <a:avLst/>
+          </a:prstGeom>
+          <a:ln w="6350">
+            <a:solidFill>
+              <a:schemeClr val="accent3"/>
+            </a:solidFill>
+            <a:headEnd type="none" w="med" len="med"/>
+            <a:tailEnd type="none" w="med" len="med"/>
+          </a:ln>
+          <a:effectLst/>
+        </p:spPr>
+        <p:style>
+          <a:lnRef idx="1">
+            <a:schemeClr val="accent2"/>
+          </a:lnRef>
+          <a:fillRef idx="2">
+            <a:schemeClr val="accent2"/>
+          </a:fillRef>
+          <a:effectRef idx="1">
+            <a:schemeClr val="accent2"/>
+          </a:effectRef>
+          <a:fontRef idx="minor">
+            <a:schemeClr val="dk1"/>
+          </a:fontRef>
+        </p:style>
+      </p:cxnSp>
+      <p:sp>
+        <p:nvSpPr>
+          <p:cNvPr id="67" name="Rectangle 11">
+            <a:extLst>
+              <a:ext uri="{FF2B5EF4-FFF2-40B4-BE49-F238E27FC236}">
+                <a16:creationId xmlns:a16="http://schemas.microsoft.com/office/drawing/2014/main" id="{CD9DA695-45FD-43D2-B496-4E8D9E80B1BD}"/>
+              </a:ext>
+            </a:extLst>
+          </p:cNvPr>
+          <p:cNvSpPr/>
+          <p:nvPr/>
+        </p:nvSpPr>
+        <p:spPr>
+          <a:xfrm>
+            <a:off x="2755727" y="5258150"/>
+            <a:ext cx="1093635" cy="236841"/>
+          </a:xfrm>
+          <a:prstGeom prst="rect">
+            <a:avLst/>
+          </a:prstGeom>
+          <a:ln w="19050">
+            <a:solidFill>
+              <a:schemeClr val="accent3"/>
+            </a:solidFill>
+          </a:ln>
+          <a:effectLst/>
+        </p:spPr>
+        <p:style>
+          <a:lnRef idx="1">
+            <a:schemeClr val="accent3"/>
+          </a:lnRef>
+          <a:fillRef idx="2">
+            <a:schemeClr val="accent3"/>
+          </a:fillRef>
+          <a:effectRef idx="1">
+            <a:schemeClr val="accent3"/>
+          </a:effectRef>
+          <a:fontRef idx="minor">
+            <a:schemeClr val="dk1"/>
+          </a:fontRef>
+        </p:style>
+        <p:txBody>
+          <a:bodyPr rtlCol="0" anchor="ctr"/>
+          <a:lstStyle/>
+          <a:p>
+            <a:pPr algn="ctr"/>
+            <a:r>
+              <a:rPr lang="en-US" sz="1050" b="1" dirty="0" err="1">
+                <a:solidFill>
+                  <a:schemeClr val="accent3">
+                    <a:lumMod val="75000"/>
+                  </a:schemeClr>
+                </a:solidFill>
+              </a:rPr>
+              <a:t>StaffListPanel</a:t>
+            </a:r>
+            <a:endParaRPr lang="en-SG" sz="1050" b="1" dirty="0">
+              <a:solidFill>
+                <a:schemeClr val="accent3">
+                  <a:lumMod val="75000"/>
+                </a:schemeClr>
+              </a:solidFill>
+            </a:endParaRPr>
+          </a:p>
+        </p:txBody>
+      </p:sp>
+      <p:cxnSp>
+        <p:nvCxnSpPr>
+          <p:cNvPr id="68" name="Elbow Connector 63">
+            <a:extLst>
+              <a:ext uri="{FF2B5EF4-FFF2-40B4-BE49-F238E27FC236}">
+                <a16:creationId xmlns:a16="http://schemas.microsoft.com/office/drawing/2014/main" id="{F93644AE-8EE4-4654-9565-F12F8CDA3409}"/>
+              </a:ext>
+            </a:extLst>
+          </p:cNvPr>
+          <p:cNvCxnSpPr>
+            <a:cxnSpLocks/>
+            <a:stCxn id="39" idx="2"/>
+            <a:endCxn id="67" idx="1"/>
+          </p:cNvCxnSpPr>
+          <p:nvPr/>
+        </p:nvCxnSpPr>
+        <p:spPr>
+          <a:xfrm rot="16200000" flipH="1">
+            <a:off x="761022" y="3381865"/>
+            <a:ext cx="3803945" cy="185466"/>
+          </a:xfrm>
+          <a:prstGeom prst="bentConnector2">
+            <a:avLst/>
+          </a:prstGeom>
+          <a:ln w="19050">
+            <a:solidFill>
+              <a:schemeClr val="accent3"/>
+            </a:solidFill>
+            <a:headEnd type="none" w="med" len="med"/>
+            <a:tailEnd type="arrow" w="med" len="med"/>
+          </a:ln>
+          <a:effectLst/>
+        </p:spPr>
+        <p:style>
+          <a:lnRef idx="1">
+            <a:schemeClr val="accent2"/>
+          </a:lnRef>
+          <a:fillRef idx="2">
+            <a:schemeClr val="accent2"/>
+          </a:fillRef>
+          <a:effectRef idx="1">
+            <a:schemeClr val="accent2"/>
+          </a:effectRef>
+          <a:fontRef idx="minor">
+            <a:schemeClr val="dk1"/>
+          </a:fontRef>
+        </p:style>
+      </p:cxnSp>
+      <p:cxnSp>
+        <p:nvCxnSpPr>
+          <p:cNvPr id="69" name="Elbow Connector 63">
+            <a:extLst>
+              <a:ext uri="{FF2B5EF4-FFF2-40B4-BE49-F238E27FC236}">
+                <a16:creationId xmlns:a16="http://schemas.microsoft.com/office/drawing/2014/main" id="{75DE5893-9279-4CD3-AA83-4CD973548931}"/>
+              </a:ext>
+            </a:extLst>
+          </p:cNvPr>
+          <p:cNvCxnSpPr>
+            <a:cxnSpLocks/>
+            <a:stCxn id="16" idx="3"/>
+            <a:endCxn id="67" idx="3"/>
+          </p:cNvCxnSpPr>
+          <p:nvPr/>
+        </p:nvCxnSpPr>
+        <p:spPr>
+          <a:xfrm rot="5400000">
+            <a:off x="2573748" y="2266215"/>
+            <a:ext cx="4385970" cy="1834742"/>
+          </a:xfrm>
+          <a:prstGeom prst="bentConnector2">
+            <a:avLst/>
+          </a:prstGeom>
+          <a:ln w="6350">
+            <a:solidFill>
+              <a:schemeClr val="accent3"/>
+            </a:solidFill>
+            <a:headEnd type="none" w="med" len="med"/>
+            <a:tailEnd type="none" w="med" len="med"/>
+          </a:ln>
+          <a:effectLst/>
+        </p:spPr>
+        <p:style>
+          <a:lnRef idx="1">
+            <a:schemeClr val="accent2"/>
+          </a:lnRef>
+          <a:fillRef idx="2">
+            <a:schemeClr val="accent2"/>
+          </a:fillRef>
+          <a:effectRef idx="1">
+            <a:schemeClr val="accent2"/>
+          </a:effectRef>
+          <a:fontRef idx="minor">
+            <a:schemeClr val="dk1"/>
+          </a:fontRef>
+        </p:style>
+      </p:cxnSp>
+      <p:sp>
+        <p:nvSpPr>
+          <p:cNvPr id="75" name="Rectangle 11">
+            <a:extLst>
+              <a:ext uri="{FF2B5EF4-FFF2-40B4-BE49-F238E27FC236}">
+                <a16:creationId xmlns:a16="http://schemas.microsoft.com/office/drawing/2014/main" id="{5CA37FD2-9AAD-4BE6-94B1-F707C3E32BC8}"/>
+              </a:ext>
+            </a:extLst>
+          </p:cNvPr>
+          <p:cNvSpPr/>
+          <p:nvPr/>
+        </p:nvSpPr>
+        <p:spPr>
+          <a:xfrm>
+            <a:off x="2744018" y="5876318"/>
+            <a:ext cx="1524916" cy="236841"/>
+          </a:xfrm>
+          <a:prstGeom prst="rect">
+            <a:avLst/>
+          </a:prstGeom>
+          <a:ln w="19050">
+            <a:solidFill>
+              <a:schemeClr val="accent3"/>
+            </a:solidFill>
+          </a:ln>
+          <a:effectLst/>
+        </p:spPr>
+        <p:style>
+          <a:lnRef idx="1">
+            <a:schemeClr val="accent3"/>
+          </a:lnRef>
+          <a:fillRef idx="2">
+            <a:schemeClr val="accent3"/>
+          </a:fillRef>
+          <a:effectRef idx="1">
+            <a:schemeClr val="accent3"/>
+          </a:effectRef>
+          <a:fontRef idx="minor">
+            <a:schemeClr val="dk1"/>
+          </a:fontRef>
+        </p:style>
+        <p:txBody>
+          <a:bodyPr rtlCol="0" anchor="ctr"/>
+          <a:lstStyle/>
+          <a:p>
+            <a:pPr algn="ctr"/>
+            <a:r>
+              <a:rPr lang="en-US" sz="1050" b="1" dirty="0" err="1">
+                <a:solidFill>
+                  <a:schemeClr val="accent3">
+                    <a:lumMod val="75000"/>
+                  </a:schemeClr>
+                </a:solidFill>
+              </a:rPr>
+              <a:t>PurchaseOrderListPanel</a:t>
+            </a:r>
+            <a:endParaRPr lang="en-SG" sz="1050" b="1" dirty="0">
+              <a:solidFill>
+                <a:schemeClr val="accent3">
+                  <a:lumMod val="75000"/>
+                </a:schemeClr>
+              </a:solidFill>
+            </a:endParaRPr>
+          </a:p>
+        </p:txBody>
+      </p:sp>
+      <p:cxnSp>
+        <p:nvCxnSpPr>
+          <p:cNvPr id="76" name="Elbow Connector 63">
+            <a:extLst>
+              <a:ext uri="{FF2B5EF4-FFF2-40B4-BE49-F238E27FC236}">
+                <a16:creationId xmlns:a16="http://schemas.microsoft.com/office/drawing/2014/main" id="{E59EA43D-CD55-4BBD-A7AE-2C1BE451A807}"/>
+              </a:ext>
+            </a:extLst>
+          </p:cNvPr>
+          <p:cNvCxnSpPr>
+            <a:cxnSpLocks/>
+            <a:stCxn id="39" idx="2"/>
+            <a:endCxn id="75" idx="1"/>
+          </p:cNvCxnSpPr>
+          <p:nvPr/>
+        </p:nvCxnSpPr>
+        <p:spPr>
+          <a:xfrm rot="16200000" flipH="1">
+            <a:off x="446083" y="3696803"/>
+            <a:ext cx="4422113" cy="173757"/>
+          </a:xfrm>
+          <a:prstGeom prst="bentConnector2">
+            <a:avLst/>
+          </a:prstGeom>
+          <a:ln w="19050">
+            <a:solidFill>
+              <a:schemeClr val="accent3"/>
+            </a:solidFill>
+            <a:headEnd type="none" w="med" len="med"/>
+            <a:tailEnd type="arrow" w="med" len="med"/>
+          </a:ln>
+          <a:effectLst/>
+        </p:spPr>
+        <p:style>
+          <a:lnRef idx="1">
+            <a:schemeClr val="accent2"/>
+          </a:lnRef>
+          <a:fillRef idx="2">
+            <a:schemeClr val="accent2"/>
+          </a:fillRef>
+          <a:effectRef idx="1">
+            <a:schemeClr val="accent2"/>
+          </a:effectRef>
+          <a:fontRef idx="minor">
+            <a:schemeClr val="dk1"/>
+          </a:fontRef>
+        </p:style>
+      </p:cxnSp>
+      <p:cxnSp>
+        <p:nvCxnSpPr>
+          <p:cNvPr id="78" name="Elbow Connector 63">
+            <a:extLst>
+              <a:ext uri="{FF2B5EF4-FFF2-40B4-BE49-F238E27FC236}">
+                <a16:creationId xmlns:a16="http://schemas.microsoft.com/office/drawing/2014/main" id="{3AD8023A-217F-47F5-AD26-4AB23810D914}"/>
+              </a:ext>
+            </a:extLst>
+          </p:cNvPr>
+          <p:cNvCxnSpPr>
+            <a:cxnSpLocks/>
+            <a:stCxn id="16" idx="3"/>
+            <a:endCxn id="75" idx="3"/>
+          </p:cNvCxnSpPr>
+          <p:nvPr/>
+        </p:nvCxnSpPr>
+        <p:spPr>
+          <a:xfrm rot="5400000">
+            <a:off x="2474450" y="2785085"/>
+            <a:ext cx="5004138" cy="1415170"/>
+          </a:xfrm>
+          <a:prstGeom prst="bentConnector2">
+            <a:avLst/>
+          </a:prstGeom>
+          <a:ln w="6350">
+            <a:solidFill>
+              <a:schemeClr val="accent3"/>
+            </a:solidFill>
+            <a:headEnd type="none" w="med" len="med"/>
+            <a:tailEnd type="none" w="med" len="med"/>
+          </a:ln>
+          <a:effectLst/>
+        </p:spPr>
+        <p:style>
+          <a:lnRef idx="1">
+            <a:schemeClr val="accent2"/>
+          </a:lnRef>
+          <a:fillRef idx="2">
+            <a:schemeClr val="accent2"/>
+          </a:fillRef>
+          <a:effectRef idx="1">
+            <a:schemeClr val="accent2"/>
+          </a:effectRef>
+          <a:fontRef idx="minor">
+            <a:schemeClr val="dk1"/>
+          </a:fontRef>
+        </p:style>
+      </p:cxnSp>
+      <p:sp>
+        <p:nvSpPr>
+          <p:cNvPr id="83" name="Rectangle 11">
+            <a:extLst>
+              <a:ext uri="{FF2B5EF4-FFF2-40B4-BE49-F238E27FC236}">
+                <a16:creationId xmlns:a16="http://schemas.microsoft.com/office/drawing/2014/main" id="{3B6B585B-F901-41BD-AD7E-1D1535B3F5EF}"/>
+              </a:ext>
+            </a:extLst>
+          </p:cNvPr>
+          <p:cNvSpPr/>
+          <p:nvPr/>
+        </p:nvSpPr>
+        <p:spPr>
+          <a:xfrm>
+            <a:off x="2735183" y="2698670"/>
+            <a:ext cx="1093635" cy="236841"/>
+          </a:xfrm>
+          <a:prstGeom prst="rect">
+            <a:avLst/>
+          </a:prstGeom>
+          <a:ln w="19050">
+            <a:solidFill>
+              <a:schemeClr val="accent3"/>
+            </a:solidFill>
+          </a:ln>
+          <a:effectLst/>
+        </p:spPr>
+        <p:style>
+          <a:lnRef idx="1">
+            <a:schemeClr val="accent3"/>
+          </a:lnRef>
+          <a:fillRef idx="2">
+            <a:schemeClr val="accent3"/>
+          </a:fillRef>
+          <a:effectRef idx="1">
+            <a:schemeClr val="accent3"/>
+          </a:effectRef>
+          <a:fontRef idx="minor">
+            <a:schemeClr val="dk1"/>
+          </a:fontRef>
+        </p:style>
+        <p:txBody>
+          <a:bodyPr rtlCol="0" anchor="ctr"/>
+          <a:lstStyle/>
+          <a:p>
+            <a:pPr algn="ctr"/>
+            <a:r>
+              <a:rPr lang="en-US" sz="1050" b="1" dirty="0" err="1">
+                <a:solidFill>
+                  <a:schemeClr val="accent3">
+                    <a:lumMod val="75000"/>
+                  </a:schemeClr>
+                </a:solidFill>
+              </a:rPr>
+              <a:t>ItemTableView</a:t>
+            </a:r>
+            <a:endParaRPr lang="en-SG" sz="1050" b="1" dirty="0">
+              <a:solidFill>
+                <a:schemeClr val="accent3">
+                  <a:lumMod val="75000"/>
+                </a:schemeClr>
+              </a:solidFill>
+            </a:endParaRPr>
+          </a:p>
+        </p:txBody>
+      </p:sp>
+      <p:cxnSp>
+        <p:nvCxnSpPr>
+          <p:cNvPr id="84" name="Elbow Connector 63">
+            <a:extLst>
+              <a:ext uri="{FF2B5EF4-FFF2-40B4-BE49-F238E27FC236}">
+                <a16:creationId xmlns:a16="http://schemas.microsoft.com/office/drawing/2014/main" id="{74BD1A8B-FCA7-4603-AF33-5C9EF80585D8}"/>
+              </a:ext>
+            </a:extLst>
+          </p:cNvPr>
+          <p:cNvCxnSpPr>
+            <a:cxnSpLocks/>
+            <a:stCxn id="39" idx="2"/>
+            <a:endCxn id="83" idx="1"/>
+          </p:cNvCxnSpPr>
+          <p:nvPr/>
+        </p:nvCxnSpPr>
+        <p:spPr>
+          <a:xfrm rot="16200000" flipH="1">
+            <a:off x="2030490" y="2112397"/>
+            <a:ext cx="1244465" cy="164922"/>
+          </a:xfrm>
+          <a:prstGeom prst="bentConnector2">
+            <a:avLst/>
+          </a:prstGeom>
+          <a:ln w="19050">
+            <a:solidFill>
+              <a:schemeClr val="accent3"/>
+            </a:solidFill>
+            <a:headEnd type="none" w="med" len="med"/>
+            <a:tailEnd type="arrow" w="med" len="med"/>
+          </a:ln>
+          <a:effectLst/>
+        </p:spPr>
+        <p:style>
+          <a:lnRef idx="1">
+            <a:schemeClr val="accent2"/>
+          </a:lnRef>
+          <a:fillRef idx="2">
+            <a:schemeClr val="accent2"/>
+          </a:fillRef>
+          <a:effectRef idx="1">
+            <a:schemeClr val="accent2"/>
+          </a:effectRef>
+          <a:fontRef idx="minor">
+            <a:schemeClr val="dk1"/>
+          </a:fontRef>
+        </p:style>
+      </p:cxnSp>
+      <p:cxnSp>
+        <p:nvCxnSpPr>
+          <p:cNvPr id="85" name="Elbow Connector 63">
+            <a:extLst>
+              <a:ext uri="{FF2B5EF4-FFF2-40B4-BE49-F238E27FC236}">
+                <a16:creationId xmlns:a16="http://schemas.microsoft.com/office/drawing/2014/main" id="{92D2B422-6EA4-499A-BD63-5960B07AE43A}"/>
+              </a:ext>
+            </a:extLst>
+          </p:cNvPr>
+          <p:cNvCxnSpPr>
+            <a:cxnSpLocks/>
+            <a:stCxn id="16" idx="3"/>
+            <a:endCxn id="83" idx="3"/>
+          </p:cNvCxnSpPr>
+          <p:nvPr/>
+        </p:nvCxnSpPr>
+        <p:spPr>
+          <a:xfrm rot="5400000">
+            <a:off x="3843216" y="976203"/>
+            <a:ext cx="1826490" cy="1855286"/>
+          </a:xfrm>
+          <a:prstGeom prst="bentConnector2">
+            <a:avLst/>
+          </a:prstGeom>
+          <a:ln w="6350">
+            <a:solidFill>
+              <a:schemeClr val="accent3"/>
+            </a:solidFill>
+            <a:headEnd type="none" w="med" len="med"/>
+            <a:tailEnd type="none" w="med" len="med"/>
+          </a:ln>
+          <a:effectLst/>
+        </p:spPr>
+        <p:style>
+          <a:lnRef idx="1">
+            <a:schemeClr val="accent2"/>
+          </a:lnRef>
+          <a:fillRef idx="2">
+            <a:schemeClr val="accent2"/>
+          </a:fillRef>
+          <a:effectRef idx="1">
+            <a:schemeClr val="accent2"/>
+          </a:effectRef>
+          <a:fontRef idx="minor">
+            <a:schemeClr val="dk1"/>
+          </a:fontRef>
+        </p:style>
+      </p:cxnSp>
+      <p:sp>
+        <p:nvSpPr>
+          <p:cNvPr id="87" name="Rectangle 11">
+            <a:extLst>
+              <a:ext uri="{FF2B5EF4-FFF2-40B4-BE49-F238E27FC236}">
+                <a16:creationId xmlns:a16="http://schemas.microsoft.com/office/drawing/2014/main" id="{540E3292-2BBE-4908-B449-2D2B79214EA0}"/>
+              </a:ext>
+            </a:extLst>
+          </p:cNvPr>
+          <p:cNvSpPr/>
+          <p:nvPr/>
+        </p:nvSpPr>
+        <p:spPr>
+          <a:xfrm>
+            <a:off x="2735182" y="3023926"/>
+            <a:ext cx="1093635" cy="236841"/>
+          </a:xfrm>
+          <a:prstGeom prst="rect">
+            <a:avLst/>
+          </a:prstGeom>
+          <a:ln w="19050">
+            <a:solidFill>
+              <a:schemeClr val="accent3"/>
+            </a:solidFill>
+          </a:ln>
+          <a:effectLst/>
+        </p:spPr>
+        <p:style>
+          <a:lnRef idx="1">
+            <a:schemeClr val="accent3"/>
+          </a:lnRef>
+          <a:fillRef idx="2">
+            <a:schemeClr val="accent3"/>
+          </a:fillRef>
+          <a:effectRef idx="1">
+            <a:schemeClr val="accent3"/>
+          </a:effectRef>
+          <a:fontRef idx="minor">
+            <a:schemeClr val="dk1"/>
+          </a:fontRef>
+        </p:style>
+        <p:txBody>
+          <a:bodyPr rtlCol="0" anchor="ctr"/>
+          <a:lstStyle/>
+          <a:p>
+            <a:pPr algn="ctr"/>
+            <a:r>
+              <a:rPr lang="en-US" sz="1050" b="1" dirty="0" err="1">
+                <a:solidFill>
+                  <a:schemeClr val="accent3">
+                    <a:lumMod val="75000"/>
+                  </a:schemeClr>
+                </a:solidFill>
+              </a:rPr>
+              <a:t>SaleTableView</a:t>
+            </a:r>
+            <a:endParaRPr lang="en-SG" sz="1050" b="1" dirty="0">
+              <a:solidFill>
+                <a:schemeClr val="accent3">
+                  <a:lumMod val="75000"/>
+                </a:schemeClr>
+              </a:solidFill>
+            </a:endParaRPr>
+          </a:p>
+        </p:txBody>
+      </p:sp>
+      <p:cxnSp>
+        <p:nvCxnSpPr>
+          <p:cNvPr id="89" name="Elbow Connector 63">
+            <a:extLst>
+              <a:ext uri="{FF2B5EF4-FFF2-40B4-BE49-F238E27FC236}">
+                <a16:creationId xmlns:a16="http://schemas.microsoft.com/office/drawing/2014/main" id="{FF6815C4-685F-487D-8853-456F5E009EE2}"/>
+              </a:ext>
+            </a:extLst>
+          </p:cNvPr>
+          <p:cNvCxnSpPr>
+            <a:cxnSpLocks/>
+            <a:stCxn id="39" idx="2"/>
+            <a:endCxn id="87" idx="1"/>
+          </p:cNvCxnSpPr>
+          <p:nvPr/>
+        </p:nvCxnSpPr>
+        <p:spPr>
+          <a:xfrm rot="16200000" flipH="1">
+            <a:off x="1867861" y="2275025"/>
+            <a:ext cx="1569721" cy="164921"/>
+          </a:xfrm>
+          <a:prstGeom prst="bentConnector2">
+            <a:avLst/>
+          </a:prstGeom>
+          <a:ln w="19050">
+            <a:solidFill>
+              <a:schemeClr val="accent3"/>
+            </a:solidFill>
+            <a:headEnd type="none" w="med" len="med"/>
+            <a:tailEnd type="arrow" w="med" len="med"/>
+          </a:ln>
+          <a:effectLst/>
+        </p:spPr>
+        <p:style>
+          <a:lnRef idx="1">
+            <a:schemeClr val="accent2"/>
+          </a:lnRef>
+          <a:fillRef idx="2">
+            <a:schemeClr val="accent2"/>
+          </a:fillRef>
+          <a:effectRef idx="1">
+            <a:schemeClr val="accent2"/>
+          </a:effectRef>
+          <a:fontRef idx="minor">
+            <a:schemeClr val="dk1"/>
+          </a:fontRef>
+        </p:style>
+      </p:cxnSp>
+      <p:cxnSp>
+        <p:nvCxnSpPr>
+          <p:cNvPr id="90" name="Elbow Connector 63">
+            <a:extLst>
+              <a:ext uri="{FF2B5EF4-FFF2-40B4-BE49-F238E27FC236}">
+                <a16:creationId xmlns:a16="http://schemas.microsoft.com/office/drawing/2014/main" id="{E30B8A12-5953-46FC-B316-6AAEF6FECFB5}"/>
+              </a:ext>
+            </a:extLst>
+          </p:cNvPr>
+          <p:cNvCxnSpPr>
+            <a:cxnSpLocks/>
+            <a:stCxn id="16" idx="3"/>
+            <a:endCxn id="87" idx="3"/>
+          </p:cNvCxnSpPr>
+          <p:nvPr/>
+        </p:nvCxnSpPr>
+        <p:spPr>
+          <a:xfrm rot="5400000">
+            <a:off x="3680588" y="1138831"/>
+            <a:ext cx="2151746" cy="1855287"/>
+          </a:xfrm>
+          <a:prstGeom prst="bentConnector2">
+            <a:avLst/>
+          </a:prstGeom>
+          <a:ln w="6350">
+            <a:solidFill>
+              <a:schemeClr val="accent3"/>
+            </a:solidFill>
+            <a:headEnd type="none" w="med" len="med"/>
+            <a:tailEnd type="none" w="med" len="med"/>
+          </a:ln>
+          <a:effectLst/>
+        </p:spPr>
+        <p:style>
+          <a:lnRef idx="1">
+            <a:schemeClr val="accent2"/>
+          </a:lnRef>
+          <a:fillRef idx="2">
+            <a:schemeClr val="accent2"/>
+          </a:fillRef>
+          <a:effectRef idx="1">
+            <a:schemeClr val="accent2"/>
+          </a:effectRef>
+          <a:fontRef idx="minor">
+            <a:schemeClr val="dk1"/>
+          </a:fontRef>
+        </p:style>
+      </p:cxnSp>
+      <p:sp>
+        <p:nvSpPr>
+          <p:cNvPr id="96" name="Rectangle 11">
+            <a:extLst>
+              <a:ext uri="{FF2B5EF4-FFF2-40B4-BE49-F238E27FC236}">
+                <a16:creationId xmlns:a16="http://schemas.microsoft.com/office/drawing/2014/main" id="{CE800345-3AC7-4F19-B466-BEAEE9D0841E}"/>
+              </a:ext>
+            </a:extLst>
+          </p:cNvPr>
+          <p:cNvSpPr/>
+          <p:nvPr/>
+        </p:nvSpPr>
+        <p:spPr>
+          <a:xfrm>
+            <a:off x="2746661" y="3382969"/>
+            <a:ext cx="1093635" cy="236841"/>
+          </a:xfrm>
+          <a:prstGeom prst="rect">
+            <a:avLst/>
+          </a:prstGeom>
+          <a:ln w="19050">
+            <a:solidFill>
+              <a:schemeClr val="accent3"/>
+            </a:solidFill>
+          </a:ln>
+          <a:effectLst/>
+        </p:spPr>
+        <p:style>
+          <a:lnRef idx="1">
+            <a:schemeClr val="accent3"/>
+          </a:lnRef>
+          <a:fillRef idx="2">
+            <a:schemeClr val="accent3"/>
+          </a:fillRef>
+          <a:effectRef idx="1">
+            <a:schemeClr val="accent3"/>
+          </a:effectRef>
+          <a:fontRef idx="minor">
+            <a:schemeClr val="dk1"/>
+          </a:fontRef>
+        </p:style>
+        <p:txBody>
+          <a:bodyPr rtlCol="0" anchor="ctr"/>
+          <a:lstStyle/>
+          <a:p>
+            <a:pPr algn="ctr"/>
+            <a:r>
+              <a:rPr lang="en-US" sz="1050" b="1" dirty="0" err="1">
+                <a:solidFill>
+                  <a:schemeClr val="accent3">
+                    <a:lumMod val="75000"/>
+                  </a:schemeClr>
+                </a:solidFill>
+              </a:rPr>
+              <a:t>StaffTableView</a:t>
+            </a:r>
+            <a:endParaRPr lang="en-SG" sz="1050" b="1" dirty="0">
+              <a:solidFill>
+                <a:schemeClr val="accent3">
+                  <a:lumMod val="75000"/>
+                </a:schemeClr>
+              </a:solidFill>
+            </a:endParaRPr>
+          </a:p>
+        </p:txBody>
+      </p:sp>
+      <p:cxnSp>
+        <p:nvCxnSpPr>
+          <p:cNvPr id="97" name="Elbow Connector 63">
+            <a:extLst>
+              <a:ext uri="{FF2B5EF4-FFF2-40B4-BE49-F238E27FC236}">
+                <a16:creationId xmlns:a16="http://schemas.microsoft.com/office/drawing/2014/main" id="{779CAA7C-C06D-4F3E-B51D-493B05BE3BAD}"/>
+              </a:ext>
+            </a:extLst>
+          </p:cNvPr>
+          <p:cNvCxnSpPr>
+            <a:cxnSpLocks/>
+            <a:stCxn id="39" idx="2"/>
+            <a:endCxn id="96" idx="1"/>
+          </p:cNvCxnSpPr>
+          <p:nvPr/>
+        </p:nvCxnSpPr>
+        <p:spPr>
+          <a:xfrm rot="16200000" flipH="1">
+            <a:off x="1694079" y="2448808"/>
+            <a:ext cx="1928764" cy="176400"/>
+          </a:xfrm>
+          <a:prstGeom prst="bentConnector2">
+            <a:avLst/>
+          </a:prstGeom>
+          <a:ln w="19050">
+            <a:solidFill>
+              <a:schemeClr val="accent3"/>
+            </a:solidFill>
+            <a:headEnd type="none" w="med" len="med"/>
+            <a:tailEnd type="arrow" w="med" len="med"/>
+          </a:ln>
+          <a:effectLst/>
+        </p:spPr>
+        <p:style>
+          <a:lnRef idx="1">
+            <a:schemeClr val="accent2"/>
+          </a:lnRef>
+          <a:fillRef idx="2">
+            <a:schemeClr val="accent2"/>
+          </a:fillRef>
+          <a:effectRef idx="1">
+            <a:schemeClr val="accent2"/>
+          </a:effectRef>
+          <a:fontRef idx="minor">
+            <a:schemeClr val="dk1"/>
+          </a:fontRef>
+        </p:style>
+      </p:cxnSp>
+      <p:cxnSp>
+        <p:nvCxnSpPr>
+          <p:cNvPr id="98" name="Elbow Connector 63">
+            <a:extLst>
+              <a:ext uri="{FF2B5EF4-FFF2-40B4-BE49-F238E27FC236}">
+                <a16:creationId xmlns:a16="http://schemas.microsoft.com/office/drawing/2014/main" id="{6862734E-A1DA-49A9-AE3B-3DE3B8DDDF6F}"/>
+              </a:ext>
+            </a:extLst>
+          </p:cNvPr>
+          <p:cNvCxnSpPr>
+            <a:cxnSpLocks/>
+            <a:stCxn id="16" idx="3"/>
+            <a:endCxn id="96" idx="3"/>
+          </p:cNvCxnSpPr>
+          <p:nvPr/>
+        </p:nvCxnSpPr>
+        <p:spPr>
+          <a:xfrm rot="5400000">
+            <a:off x="3506806" y="1324091"/>
+            <a:ext cx="2510789" cy="1843808"/>
+          </a:xfrm>
+          <a:prstGeom prst="bentConnector2">
+            <a:avLst/>
+          </a:prstGeom>
+          <a:ln w="6350">
+            <a:solidFill>
+              <a:schemeClr val="accent3"/>
+            </a:solidFill>
+            <a:headEnd type="none" w="med" len="med"/>
+            <a:tailEnd type="none" w="med" len="med"/>
+          </a:ln>
+          <a:effectLst/>
+        </p:spPr>
+        <p:style>
+          <a:lnRef idx="1">
+            <a:schemeClr val="accent2"/>
+          </a:lnRef>
+          <a:fillRef idx="2">
+            <a:schemeClr val="accent2"/>
+          </a:fillRef>
+          <a:effectRef idx="1">
+            <a:schemeClr val="accent2"/>
+          </a:effectRef>
+          <a:fontRef idx="minor">
+            <a:schemeClr val="dk1"/>
+          </a:fontRef>
+        </p:style>
+      </p:cxnSp>
+      <p:sp>
+        <p:nvSpPr>
+          <p:cNvPr id="99" name="Rectangle 11">
+            <a:extLst>
+              <a:ext uri="{FF2B5EF4-FFF2-40B4-BE49-F238E27FC236}">
+                <a16:creationId xmlns:a16="http://schemas.microsoft.com/office/drawing/2014/main" id="{E2AA21C1-0845-452E-95C3-CACD030D94C2}"/>
+              </a:ext>
+            </a:extLst>
+          </p:cNvPr>
+          <p:cNvSpPr/>
+          <p:nvPr/>
+        </p:nvSpPr>
+        <p:spPr>
+          <a:xfrm>
+            <a:off x="2744018" y="3728828"/>
+            <a:ext cx="1675582" cy="236841"/>
+          </a:xfrm>
+          <a:prstGeom prst="rect">
+            <a:avLst/>
+          </a:prstGeom>
+          <a:ln w="19050">
+            <a:solidFill>
+              <a:schemeClr val="accent3"/>
+            </a:solidFill>
+          </a:ln>
+          <a:effectLst/>
+        </p:spPr>
+        <p:style>
+          <a:lnRef idx="1">
+            <a:schemeClr val="accent3"/>
+          </a:lnRef>
+          <a:fillRef idx="2">
+            <a:schemeClr val="accent3"/>
+          </a:fillRef>
+          <a:effectRef idx="1">
+            <a:schemeClr val="accent3"/>
+          </a:effectRef>
+          <a:fontRef idx="minor">
+            <a:schemeClr val="dk1"/>
+          </a:fontRef>
+        </p:style>
+        <p:txBody>
+          <a:bodyPr rtlCol="0" anchor="ctr"/>
+          <a:lstStyle/>
+          <a:p>
+            <a:pPr algn="ctr"/>
+            <a:r>
+              <a:rPr lang="en-US" sz="1050" b="1" dirty="0" err="1">
+                <a:solidFill>
+                  <a:schemeClr val="accent3">
+                    <a:lumMod val="75000"/>
+                  </a:schemeClr>
+                </a:solidFill>
+              </a:rPr>
+              <a:t>PruchaseOrderTableView</a:t>
+            </a:r>
+            <a:endParaRPr lang="en-SG" sz="1050" b="1" dirty="0">
+              <a:solidFill>
+                <a:schemeClr val="accent3">
+                  <a:lumMod val="75000"/>
+                </a:schemeClr>
+              </a:solidFill>
+            </a:endParaRPr>
+          </a:p>
+        </p:txBody>
+      </p:sp>
+      <p:cxnSp>
+        <p:nvCxnSpPr>
+          <p:cNvPr id="100" name="Elbow Connector 63">
+            <a:extLst>
+              <a:ext uri="{FF2B5EF4-FFF2-40B4-BE49-F238E27FC236}">
+                <a16:creationId xmlns:a16="http://schemas.microsoft.com/office/drawing/2014/main" id="{EB07BE4B-0E65-45C8-BF36-F59D7831C94D}"/>
+              </a:ext>
+            </a:extLst>
+          </p:cNvPr>
+          <p:cNvCxnSpPr>
+            <a:cxnSpLocks/>
+            <a:stCxn id="39" idx="2"/>
+            <a:endCxn id="99" idx="1"/>
+          </p:cNvCxnSpPr>
+          <p:nvPr/>
+        </p:nvCxnSpPr>
+        <p:spPr>
+          <a:xfrm rot="16200000" flipH="1">
+            <a:off x="1519828" y="2623058"/>
+            <a:ext cx="2274623" cy="173757"/>
+          </a:xfrm>
+          <a:prstGeom prst="bentConnector2">
+            <a:avLst/>
+          </a:prstGeom>
+          <a:ln w="19050">
+            <a:solidFill>
+              <a:schemeClr val="accent3"/>
+            </a:solidFill>
+            <a:headEnd type="none" w="med" len="med"/>
+            <a:tailEnd type="arrow" w="med" len="med"/>
+          </a:ln>
+          <a:effectLst/>
+        </p:spPr>
+        <p:style>
+          <a:lnRef idx="1">
+            <a:schemeClr val="accent2"/>
+          </a:lnRef>
+          <a:fillRef idx="2">
+            <a:schemeClr val="accent2"/>
+          </a:fillRef>
+          <a:effectRef idx="1">
+            <a:schemeClr val="accent2"/>
+          </a:effectRef>
+          <a:fontRef idx="minor">
+            <a:schemeClr val="dk1"/>
+          </a:fontRef>
+        </p:style>
+      </p:cxnSp>
+      <p:cxnSp>
+        <p:nvCxnSpPr>
+          <p:cNvPr id="101" name="Elbow Connector 63">
+            <a:extLst>
+              <a:ext uri="{FF2B5EF4-FFF2-40B4-BE49-F238E27FC236}">
+                <a16:creationId xmlns:a16="http://schemas.microsoft.com/office/drawing/2014/main" id="{66EFC5DD-B4BD-4BDC-83B0-EA5D5017539E}"/>
+              </a:ext>
+            </a:extLst>
+          </p:cNvPr>
+          <p:cNvCxnSpPr>
+            <a:cxnSpLocks/>
+            <a:stCxn id="16" idx="3"/>
+            <a:endCxn id="99" idx="3"/>
+          </p:cNvCxnSpPr>
+          <p:nvPr/>
+        </p:nvCxnSpPr>
+        <p:spPr>
+          <a:xfrm rot="5400000">
+            <a:off x="3623528" y="1786673"/>
+            <a:ext cx="2856648" cy="1264504"/>
+          </a:xfrm>
+          <a:prstGeom prst="bentConnector2">
+            <a:avLst/>
+          </a:prstGeom>
+          <a:ln w="6350">
+            <a:solidFill>
+              <a:schemeClr val="accent3"/>
+            </a:solidFill>
+            <a:headEnd type="none" w="med" len="med"/>
+            <a:tailEnd type="none" w="med" len="med"/>
+          </a:ln>
+          <a:effectLst/>
+        </p:spPr>
+        <p:style>
+          <a:lnRef idx="1">
+            <a:schemeClr val="accent2"/>
+          </a:lnRef>
+          <a:fillRef idx="2">
+            <a:schemeClr val="accent2"/>
+          </a:fillRef>
+          <a:effectRef idx="1">
+            <a:schemeClr val="accent2"/>
+          </a:effectRef>
+          <a:fontRef idx="minor">
+            <a:schemeClr val="dk1"/>
+          </a:fontRef>
+        </p:style>
+      </p:cxnSp>
+      <p:sp>
+        <p:nvSpPr>
+          <p:cNvPr id="106" name="Freeform 117">
+            <a:extLst>
+              <a:ext uri="{FF2B5EF4-FFF2-40B4-BE49-F238E27FC236}">
+                <a16:creationId xmlns:a16="http://schemas.microsoft.com/office/drawing/2014/main" id="{E2B38DE3-775E-40DB-BE79-5B62C60E5CA1}"/>
+              </a:ext>
+            </a:extLst>
+          </p:cNvPr>
+          <p:cNvSpPr/>
+          <p:nvPr/>
+        </p:nvSpPr>
+        <p:spPr>
+          <a:xfrm flipV="1">
+            <a:off x="3836530" y="2881178"/>
+            <a:ext cx="3066909" cy="52484"/>
+          </a:xfrm>
+          <a:custGeom>
+            <a:avLst/>
+            <a:gdLst>
+              <a:gd name="connsiteX0" fmla="*/ 0 w 3048000"/>
+              <a:gd name="connsiteY0" fmla="*/ 203200 h 203200"/>
+              <a:gd name="connsiteX1" fmla="*/ 221673 w 3048000"/>
+              <a:gd name="connsiteY1" fmla="*/ 0 h 203200"/>
+              <a:gd name="connsiteX2" fmla="*/ 3048000 w 3048000"/>
+              <a:gd name="connsiteY2" fmla="*/ 0 h 203200"/>
+            </a:gdLst>
+            <a:ahLst/>
+            <a:cxnLst>
+              <a:cxn ang="0">
+                <a:pos x="connsiteX0" y="connsiteY0"/>
+              </a:cxn>
+              <a:cxn ang="0">
+                <a:pos x="connsiteX1" y="connsiteY1"/>
+              </a:cxn>
+              <a:cxn ang="0">
+                <a:pos x="connsiteX2" y="connsiteY2"/>
+              </a:cxn>
+            </a:cxnLst>
+            <a:rect l="l" t="t" r="r" b="b"/>
+            <a:pathLst>
+              <a:path w="3048000" h="203200">
+                <a:moveTo>
+                  <a:pt x="0" y="203200"/>
+                </a:moveTo>
+                <a:lnTo>
+                  <a:pt x="221673" y="0"/>
+                </a:lnTo>
+                <a:lnTo>
+                  <a:pt x="3048000" y="0"/>
+                </a:lnTo>
+              </a:path>
+            </a:pathLst>
+          </a:custGeom>
+          <a:noFill/>
+          <a:ln w="19050">
+            <a:solidFill>
+              <a:schemeClr val="accent3"/>
+            </a:solidFill>
+            <a:prstDash val="sysDot"/>
+            <a:headEnd type="none" w="med" len="med"/>
+            <a:tailEnd type="arrow" w="med" len="med"/>
+          </a:ln>
+          <a:effectLst/>
+        </p:spPr>
+        <p:style>
+          <a:lnRef idx="1">
+            <a:schemeClr val="accent2"/>
+          </a:lnRef>
+          <a:fillRef idx="2">
+            <a:schemeClr val="accent2"/>
+          </a:fillRef>
+          <a:effectRef idx="1">
+            <a:schemeClr val="accent2"/>
+          </a:effectRef>
+          <a:fontRef idx="minor">
+            <a:schemeClr val="dk1"/>
+          </a:fontRef>
+        </p:style>
+        <p:txBody>
+          <a:bodyPr rtlCol="0" anchor="ctr"/>
+          <a:lstStyle/>
+          <a:p>
+            <a:pPr algn="ctr"/>
+            <a:endParaRPr lang="en-SG"/>
+          </a:p>
+        </p:txBody>
+      </p:sp>
+      <p:sp>
+        <p:nvSpPr>
+          <p:cNvPr id="109" name="Freeform 117">
+            <a:extLst>
+              <a:ext uri="{FF2B5EF4-FFF2-40B4-BE49-F238E27FC236}">
+                <a16:creationId xmlns:a16="http://schemas.microsoft.com/office/drawing/2014/main" id="{36A6C3AA-AE8B-4A09-8F09-7D551F20CC86}"/>
+              </a:ext>
+            </a:extLst>
+          </p:cNvPr>
+          <p:cNvSpPr/>
+          <p:nvPr/>
+        </p:nvSpPr>
+        <p:spPr>
+          <a:xfrm flipV="1">
+            <a:off x="3824732" y="3180193"/>
+            <a:ext cx="3066909" cy="52484"/>
+          </a:xfrm>
+          <a:custGeom>
+            <a:avLst/>
+            <a:gdLst>
+              <a:gd name="connsiteX0" fmla="*/ 0 w 3048000"/>
+              <a:gd name="connsiteY0" fmla="*/ 203200 h 203200"/>
+              <a:gd name="connsiteX1" fmla="*/ 221673 w 3048000"/>
+              <a:gd name="connsiteY1" fmla="*/ 0 h 203200"/>
+              <a:gd name="connsiteX2" fmla="*/ 3048000 w 3048000"/>
+              <a:gd name="connsiteY2" fmla="*/ 0 h 203200"/>
+            </a:gdLst>
+            <a:ahLst/>
+            <a:cxnLst>
+              <a:cxn ang="0">
+                <a:pos x="connsiteX0" y="connsiteY0"/>
+              </a:cxn>
+              <a:cxn ang="0">
+                <a:pos x="connsiteX1" y="connsiteY1"/>
+              </a:cxn>
+              <a:cxn ang="0">
+                <a:pos x="connsiteX2" y="connsiteY2"/>
+              </a:cxn>
+            </a:cxnLst>
+            <a:rect l="l" t="t" r="r" b="b"/>
+            <a:pathLst>
+              <a:path w="3048000" h="203200">
+                <a:moveTo>
+                  <a:pt x="0" y="203200"/>
+                </a:moveTo>
+                <a:lnTo>
+                  <a:pt x="221673" y="0"/>
+                </a:lnTo>
+                <a:lnTo>
+                  <a:pt x="3048000" y="0"/>
+                </a:lnTo>
+              </a:path>
+            </a:pathLst>
+          </a:custGeom>
+          <a:noFill/>
+          <a:ln w="19050">
+            <a:solidFill>
+              <a:schemeClr val="accent3"/>
+            </a:solidFill>
+            <a:prstDash val="sysDot"/>
+            <a:headEnd type="none" w="med" len="med"/>
+            <a:tailEnd type="arrow" w="med" len="med"/>
+          </a:ln>
+          <a:effectLst/>
+        </p:spPr>
+        <p:style>
+          <a:lnRef idx="1">
+            <a:schemeClr val="accent2"/>
+          </a:lnRef>
+          <a:fillRef idx="2">
+            <a:schemeClr val="accent2"/>
+          </a:fillRef>
+          <a:effectRef idx="1">
+            <a:schemeClr val="accent2"/>
+          </a:effectRef>
+          <a:fontRef idx="minor">
+            <a:schemeClr val="dk1"/>
+          </a:fontRef>
+        </p:style>
+        <p:txBody>
+          <a:bodyPr rtlCol="0" anchor="ctr"/>
+          <a:lstStyle/>
+          <a:p>
+            <a:pPr algn="ctr"/>
+            <a:endParaRPr lang="en-SG"/>
+          </a:p>
+        </p:txBody>
+      </p:sp>
+      <p:sp>
+        <p:nvSpPr>
+          <p:cNvPr id="110" name="Freeform 117">
+            <a:extLst>
+              <a:ext uri="{FF2B5EF4-FFF2-40B4-BE49-F238E27FC236}">
+                <a16:creationId xmlns:a16="http://schemas.microsoft.com/office/drawing/2014/main" id="{C3C0E2AC-093C-427D-ACCB-36224325828F}"/>
+              </a:ext>
+            </a:extLst>
+          </p:cNvPr>
+          <p:cNvSpPr/>
+          <p:nvPr/>
+        </p:nvSpPr>
+        <p:spPr>
+          <a:xfrm flipV="1">
+            <a:off x="3849512" y="3564182"/>
+            <a:ext cx="3066909" cy="52484"/>
+          </a:xfrm>
+          <a:custGeom>
+            <a:avLst/>
+            <a:gdLst>
+              <a:gd name="connsiteX0" fmla="*/ 0 w 3048000"/>
+              <a:gd name="connsiteY0" fmla="*/ 203200 h 203200"/>
+              <a:gd name="connsiteX1" fmla="*/ 221673 w 3048000"/>
+              <a:gd name="connsiteY1" fmla="*/ 0 h 203200"/>
+              <a:gd name="connsiteX2" fmla="*/ 3048000 w 3048000"/>
+              <a:gd name="connsiteY2" fmla="*/ 0 h 203200"/>
+            </a:gdLst>
+            <a:ahLst/>
+            <a:cxnLst>
+              <a:cxn ang="0">
+                <a:pos x="connsiteX0" y="connsiteY0"/>
+              </a:cxn>
+              <a:cxn ang="0">
+                <a:pos x="connsiteX1" y="connsiteY1"/>
+              </a:cxn>
+              <a:cxn ang="0">
+                <a:pos x="connsiteX2" y="connsiteY2"/>
+              </a:cxn>
+            </a:cxnLst>
+            <a:rect l="l" t="t" r="r" b="b"/>
+            <a:pathLst>
+              <a:path w="3048000" h="203200">
+                <a:moveTo>
+                  <a:pt x="0" y="203200"/>
+                </a:moveTo>
+                <a:lnTo>
+                  <a:pt x="221673" y="0"/>
+                </a:lnTo>
+                <a:lnTo>
+                  <a:pt x="3048000" y="0"/>
+                </a:lnTo>
+              </a:path>
+            </a:pathLst>
+          </a:custGeom>
+          <a:noFill/>
+          <a:ln w="19050">
+            <a:solidFill>
+              <a:schemeClr val="accent3"/>
+            </a:solidFill>
+            <a:prstDash val="sysDot"/>
+            <a:headEnd type="none" w="med" len="med"/>
+            <a:tailEnd type="arrow" w="med" len="med"/>
+          </a:ln>
+          <a:effectLst/>
+        </p:spPr>
+        <p:style>
+          <a:lnRef idx="1">
+            <a:schemeClr val="accent2"/>
+          </a:lnRef>
+          <a:fillRef idx="2">
+            <a:schemeClr val="accent2"/>
+          </a:fillRef>
+          <a:effectRef idx="1">
+            <a:schemeClr val="accent2"/>
+          </a:effectRef>
+          <a:fontRef idx="minor">
+            <a:schemeClr val="dk1"/>
+          </a:fontRef>
+        </p:style>
+        <p:txBody>
+          <a:bodyPr rtlCol="0" anchor="ctr"/>
+          <a:lstStyle/>
+          <a:p>
+            <a:pPr algn="ctr"/>
+            <a:endParaRPr lang="en-SG"/>
+          </a:p>
+        </p:txBody>
+      </p:sp>
+      <p:sp>
+        <p:nvSpPr>
+          <p:cNvPr id="111" name="Freeform 117">
+            <a:extLst>
+              <a:ext uri="{FF2B5EF4-FFF2-40B4-BE49-F238E27FC236}">
+                <a16:creationId xmlns:a16="http://schemas.microsoft.com/office/drawing/2014/main" id="{67B1ACC8-A10F-4E9F-B681-99E40D14D175}"/>
+              </a:ext>
+            </a:extLst>
+          </p:cNvPr>
+          <p:cNvSpPr/>
+          <p:nvPr/>
+        </p:nvSpPr>
+        <p:spPr>
+          <a:xfrm flipV="1">
+            <a:off x="4418940" y="3902760"/>
+            <a:ext cx="2492190" cy="78311"/>
+          </a:xfrm>
+          <a:custGeom>
+            <a:avLst/>
+            <a:gdLst>
+              <a:gd name="connsiteX0" fmla="*/ 0 w 3048000"/>
+              <a:gd name="connsiteY0" fmla="*/ 203200 h 203200"/>
+              <a:gd name="connsiteX1" fmla="*/ 221673 w 3048000"/>
+              <a:gd name="connsiteY1" fmla="*/ 0 h 203200"/>
+              <a:gd name="connsiteX2" fmla="*/ 3048000 w 3048000"/>
+              <a:gd name="connsiteY2" fmla="*/ 0 h 203200"/>
+            </a:gdLst>
+            <a:ahLst/>
+            <a:cxnLst>
+              <a:cxn ang="0">
+                <a:pos x="connsiteX0" y="connsiteY0"/>
+              </a:cxn>
+              <a:cxn ang="0">
+                <a:pos x="connsiteX1" y="connsiteY1"/>
+              </a:cxn>
+              <a:cxn ang="0">
+                <a:pos x="connsiteX2" y="connsiteY2"/>
+              </a:cxn>
+            </a:cxnLst>
+            <a:rect l="l" t="t" r="r" b="b"/>
+            <a:pathLst>
+              <a:path w="3048000" h="203200">
+                <a:moveTo>
+                  <a:pt x="0" y="203200"/>
+                </a:moveTo>
+                <a:lnTo>
+                  <a:pt x="221673" y="0"/>
+                </a:lnTo>
+                <a:lnTo>
+                  <a:pt x="3048000" y="0"/>
+                </a:lnTo>
+              </a:path>
+            </a:pathLst>
+          </a:custGeom>
+          <a:noFill/>
+          <a:ln w="19050">
+            <a:solidFill>
+              <a:schemeClr val="accent3"/>
+            </a:solidFill>
+            <a:prstDash val="sysDot"/>
+            <a:headEnd type="none" w="med" len="med"/>
+            <a:tailEnd type="arrow" w="med" len="med"/>
+          </a:ln>
+          <a:effectLst/>
+        </p:spPr>
+        <p:style>
+          <a:lnRef idx="1">
+            <a:schemeClr val="accent2"/>
+          </a:lnRef>
+          <a:fillRef idx="2">
+            <a:schemeClr val="accent2"/>
+          </a:fillRef>
+          <a:effectRef idx="1">
+            <a:schemeClr val="accent2"/>
+          </a:effectRef>
+          <a:fontRef idx="minor">
+            <a:schemeClr val="dk1"/>
+          </a:fontRef>
+        </p:style>
+        <p:txBody>
+          <a:bodyPr rtlCol="0" anchor="ctr"/>
+          <a:lstStyle/>
+          <a:p>
+            <a:pPr algn="ctr"/>
+            <a:endParaRPr lang="en-SG"/>
+          </a:p>
+        </p:txBody>
+      </p:sp>
+      <p:sp>
+        <p:nvSpPr>
+          <p:cNvPr id="112" name="Rectangle 111">
+            <a:extLst>
+              <a:ext uri="{FF2B5EF4-FFF2-40B4-BE49-F238E27FC236}">
+                <a16:creationId xmlns:a16="http://schemas.microsoft.com/office/drawing/2014/main" id="{685612FC-DE9C-480B-BAF8-F46304C41F7B}"/>
+              </a:ext>
+            </a:extLst>
+          </p:cNvPr>
+          <p:cNvSpPr/>
+          <p:nvPr/>
+        </p:nvSpPr>
+        <p:spPr>
+          <a:xfrm>
+            <a:off x="5568483" y="2872602"/>
+            <a:ext cx="229325" cy="166560"/>
+          </a:xfrm>
+          <a:prstGeom prst="rect">
+            <a:avLst/>
+          </a:prstGeom>
+          <a:solidFill>
+            <a:schemeClr val="accent3">
+              <a:lumMod val="20000"/>
+              <a:lumOff val="80000"/>
+              <a:alpha val="80000"/>
+            </a:schemeClr>
+          </a:solidFill>
+          <a:ln>
+            <a:noFill/>
+          </a:ln>
+          <a:effectLst>
+            <a:softEdge rad="31750"/>
+          </a:effectLst>
+        </p:spPr>
+        <p:style>
+          <a:lnRef idx="2">
+            <a:schemeClr val="accent1">
+              <a:shade val="50000"/>
+            </a:schemeClr>
+          </a:lnRef>
+          <a:fillRef idx="1">
+            <a:schemeClr val="accent1"/>
+          </a:fillRef>
+          <a:effectRef idx="0">
+            <a:schemeClr val="accent1"/>
+          </a:effectRef>
+          <a:fontRef idx="minor">
+            <a:schemeClr val="lt1"/>
+          </a:fontRef>
+        </p:style>
+        <p:txBody>
+          <a:bodyPr rtlCol="0" anchor="ctr"/>
+          <a:lstStyle/>
+          <a:p>
+            <a:pPr algn="ctr"/>
+            <a:endParaRPr lang="en-SG"/>
+          </a:p>
+        </p:txBody>
+      </p:sp>
+      <p:sp>
+        <p:nvSpPr>
+          <p:cNvPr id="113" name="Rectangle 112">
+            <a:extLst>
+              <a:ext uri="{FF2B5EF4-FFF2-40B4-BE49-F238E27FC236}">
+                <a16:creationId xmlns:a16="http://schemas.microsoft.com/office/drawing/2014/main" id="{C678C169-8623-4F5C-9A62-85B104514820}"/>
+              </a:ext>
+            </a:extLst>
+          </p:cNvPr>
+          <p:cNvSpPr/>
+          <p:nvPr/>
+        </p:nvSpPr>
+        <p:spPr>
+          <a:xfrm>
+            <a:off x="5561751" y="3159434"/>
+            <a:ext cx="229325" cy="166560"/>
+          </a:xfrm>
+          <a:prstGeom prst="rect">
+            <a:avLst/>
+          </a:prstGeom>
+          <a:solidFill>
+            <a:schemeClr val="accent3">
+              <a:lumMod val="20000"/>
+              <a:lumOff val="80000"/>
+              <a:alpha val="80000"/>
+            </a:schemeClr>
+          </a:solidFill>
+          <a:ln>
+            <a:noFill/>
+          </a:ln>
+          <a:effectLst>
+            <a:softEdge rad="31750"/>
+          </a:effectLst>
+        </p:spPr>
+        <p:style>
+          <a:lnRef idx="2">
+            <a:schemeClr val="accent1">
+              <a:shade val="50000"/>
+            </a:schemeClr>
+          </a:lnRef>
+          <a:fillRef idx="1">
+            <a:schemeClr val="accent1"/>
+          </a:fillRef>
+          <a:effectRef idx="0">
+            <a:schemeClr val="accent1"/>
+          </a:effectRef>
+          <a:fontRef idx="minor">
+            <a:schemeClr val="lt1"/>
+          </a:fontRef>
+        </p:style>
+        <p:txBody>
+          <a:bodyPr rtlCol="0" anchor="ctr"/>
+          <a:lstStyle/>
+          <a:p>
+            <a:pPr algn="ctr"/>
+            <a:endParaRPr lang="en-SG"/>
+          </a:p>
+        </p:txBody>
+      </p:sp>
+      <p:sp>
+        <p:nvSpPr>
+          <p:cNvPr id="114" name="Rectangle 113">
+            <a:extLst>
+              <a:ext uri="{FF2B5EF4-FFF2-40B4-BE49-F238E27FC236}">
+                <a16:creationId xmlns:a16="http://schemas.microsoft.com/office/drawing/2014/main" id="{E39951B3-A20D-4067-A89A-CFCB853B0325}"/>
+              </a:ext>
+            </a:extLst>
+          </p:cNvPr>
+          <p:cNvSpPr/>
+          <p:nvPr/>
+        </p:nvSpPr>
+        <p:spPr>
+          <a:xfrm>
+            <a:off x="5561751" y="3537606"/>
+            <a:ext cx="229325" cy="166560"/>
+          </a:xfrm>
+          <a:prstGeom prst="rect">
+            <a:avLst/>
+          </a:prstGeom>
+          <a:solidFill>
+            <a:schemeClr val="accent3">
+              <a:lumMod val="20000"/>
+              <a:lumOff val="80000"/>
+              <a:alpha val="80000"/>
+            </a:schemeClr>
+          </a:solidFill>
+          <a:ln>
+            <a:noFill/>
+          </a:ln>
+          <a:effectLst>
+            <a:softEdge rad="31750"/>
+          </a:effectLst>
+        </p:spPr>
+        <p:style>
+          <a:lnRef idx="2">
+            <a:schemeClr val="accent1">
+              <a:shade val="50000"/>
+            </a:schemeClr>
+          </a:lnRef>
+          <a:fillRef idx="1">
+            <a:schemeClr val="accent1"/>
+          </a:fillRef>
+          <a:effectRef idx="0">
+            <a:schemeClr val="accent1"/>
+          </a:effectRef>
+          <a:fontRef idx="minor">
+            <a:schemeClr val="lt1"/>
+          </a:fontRef>
+        </p:style>
+        <p:txBody>
+          <a:bodyPr rtlCol="0" anchor="ctr"/>
+          <a:lstStyle/>
+          <a:p>
+            <a:pPr algn="ctr"/>
+            <a:endParaRPr lang="en-SG"/>
+          </a:p>
+        </p:txBody>
+      </p:sp>
+      <p:sp>
+        <p:nvSpPr>
+          <p:cNvPr id="115" name="Rectangle 114">
+            <a:extLst>
+              <a:ext uri="{FF2B5EF4-FFF2-40B4-BE49-F238E27FC236}">
+                <a16:creationId xmlns:a16="http://schemas.microsoft.com/office/drawing/2014/main" id="{5A06940D-61EA-46FC-87CA-AF7874CA3D5F}"/>
+              </a:ext>
+            </a:extLst>
+          </p:cNvPr>
+          <p:cNvSpPr/>
+          <p:nvPr/>
+        </p:nvSpPr>
+        <p:spPr>
+          <a:xfrm>
+            <a:off x="5561751" y="3885378"/>
+            <a:ext cx="229325" cy="166560"/>
+          </a:xfrm>
+          <a:prstGeom prst="rect">
+            <a:avLst/>
+          </a:prstGeom>
+          <a:solidFill>
+            <a:schemeClr val="accent3">
+              <a:lumMod val="20000"/>
+              <a:lumOff val="80000"/>
+              <a:alpha val="80000"/>
+            </a:schemeClr>
+          </a:solidFill>
+          <a:ln>
+            <a:noFill/>
+          </a:ln>
+          <a:effectLst>
+            <a:softEdge rad="31750"/>
+          </a:effectLst>
+        </p:spPr>
+        <p:style>
+          <a:lnRef idx="2">
+            <a:schemeClr val="accent1">
+              <a:shade val="50000"/>
+            </a:schemeClr>
+          </a:lnRef>
+          <a:fillRef idx="1">
+            <a:schemeClr val="accent1"/>
+          </a:fillRef>
+          <a:effectRef idx="0">
+            <a:schemeClr val="accent1"/>
+          </a:effectRef>
+          <a:fontRef idx="minor">
+            <a:schemeClr val="lt1"/>
+          </a:fontRef>
+        </p:style>
+        <p:txBody>
+          <a:bodyPr rtlCol="0" anchor="ctr"/>
+          <a:lstStyle/>
+          <a:p>
+            <a:pPr algn="ctr"/>
+            <a:endParaRPr lang="en-SG"/>
+          </a:p>
+        </p:txBody>
+      </p:sp>
+      <p:sp>
+        <p:nvSpPr>
+          <p:cNvPr id="122" name="Rectangle 121">
+            <a:extLst>
+              <a:ext uri="{FF2B5EF4-FFF2-40B4-BE49-F238E27FC236}">
+                <a16:creationId xmlns:a16="http://schemas.microsoft.com/office/drawing/2014/main" id="{2ED34A96-254E-4C21-9588-A729B3F9F6C9}"/>
+              </a:ext>
+            </a:extLst>
+          </p:cNvPr>
+          <p:cNvSpPr/>
+          <p:nvPr/>
+        </p:nvSpPr>
+        <p:spPr>
+          <a:xfrm>
+            <a:off x="5561875" y="5157615"/>
+            <a:ext cx="229325" cy="166560"/>
+          </a:xfrm>
+          <a:prstGeom prst="rect">
+            <a:avLst/>
+          </a:prstGeom>
+          <a:solidFill>
+            <a:schemeClr val="accent3">
+              <a:lumMod val="20000"/>
+              <a:lumOff val="80000"/>
+              <a:alpha val="80000"/>
+            </a:schemeClr>
+          </a:solidFill>
+          <a:ln>
+            <a:noFill/>
+          </a:ln>
+          <a:effectLst>
+            <a:softEdge rad="31750"/>
+          </a:effectLst>
+        </p:spPr>
+        <p:style>
+          <a:lnRef idx="2">
+            <a:schemeClr val="accent1">
+              <a:shade val="50000"/>
+            </a:schemeClr>
+          </a:lnRef>
+          <a:fillRef idx="1">
+            <a:schemeClr val="accent1"/>
+          </a:fillRef>
+          <a:effectRef idx="0">
+            <a:schemeClr val="accent1"/>
+          </a:effectRef>
+          <a:fontRef idx="minor">
+            <a:schemeClr val="lt1"/>
+          </a:fontRef>
+        </p:style>
+        <p:txBody>
+          <a:bodyPr rtlCol="0" anchor="ctr"/>
+          <a:lstStyle/>
+          <a:p>
+            <a:pPr algn="ctr"/>
+            <a:endParaRPr lang="en-SG"/>
+          </a:p>
+        </p:txBody>
+      </p:sp>
+      <p:sp>
+        <p:nvSpPr>
+          <p:cNvPr id="123" name="Rectangle 122">
+            <a:extLst>
+              <a:ext uri="{FF2B5EF4-FFF2-40B4-BE49-F238E27FC236}">
+                <a16:creationId xmlns:a16="http://schemas.microsoft.com/office/drawing/2014/main" id="{066AF63C-C0E0-491D-8224-582EA15A49EA}"/>
+              </a:ext>
+            </a:extLst>
+          </p:cNvPr>
+          <p:cNvSpPr/>
+          <p:nvPr/>
+        </p:nvSpPr>
+        <p:spPr>
+          <a:xfrm>
+            <a:off x="5548852" y="5777848"/>
+            <a:ext cx="229325" cy="166560"/>
+          </a:xfrm>
+          <a:prstGeom prst="rect">
+            <a:avLst/>
+          </a:prstGeom>
+          <a:solidFill>
+            <a:schemeClr val="accent3">
+              <a:lumMod val="20000"/>
+              <a:lumOff val="80000"/>
+              <a:alpha val="80000"/>
+            </a:schemeClr>
+          </a:solidFill>
+          <a:ln>
+            <a:noFill/>
+          </a:ln>
+          <a:effectLst>
+            <a:softEdge rad="31750"/>
+          </a:effectLst>
+        </p:spPr>
+        <p:style>
+          <a:lnRef idx="2">
+            <a:schemeClr val="accent1">
+              <a:shade val="50000"/>
+            </a:schemeClr>
+          </a:lnRef>
+          <a:fillRef idx="1">
+            <a:schemeClr val="accent1"/>
+          </a:fillRef>
+          <a:effectRef idx="0">
+            <a:schemeClr val="accent1"/>
+          </a:effectRef>
+          <a:fontRef idx="minor">
+            <a:schemeClr val="lt1"/>
+          </a:fontRef>
+        </p:style>
+        <p:txBody>
+          <a:bodyPr rtlCol="0" anchor="ctr"/>
+          <a:lstStyle/>
+          <a:p>
+            <a:pPr algn="ctr"/>
+            <a:endParaRPr lang="en-SG"/>
+          </a:p>
+        </p:txBody>
+      </p:sp>
+      <p:sp>
+        <p:nvSpPr>
+          <p:cNvPr id="124" name="Rectangle 123">
+            <a:extLst>
+              <a:ext uri="{FF2B5EF4-FFF2-40B4-BE49-F238E27FC236}">
+                <a16:creationId xmlns:a16="http://schemas.microsoft.com/office/drawing/2014/main" id="{8515078E-C413-4812-B5A7-5F03AE7E850D}"/>
+              </a:ext>
+            </a:extLst>
+          </p:cNvPr>
+          <p:cNvSpPr/>
+          <p:nvPr/>
+        </p:nvSpPr>
+        <p:spPr>
+          <a:xfrm>
+            <a:off x="5569833" y="6469210"/>
+            <a:ext cx="229325" cy="166560"/>
+          </a:xfrm>
+          <a:prstGeom prst="rect">
+            <a:avLst/>
+          </a:prstGeom>
+          <a:solidFill>
+            <a:schemeClr val="accent3">
+              <a:lumMod val="20000"/>
+              <a:lumOff val="80000"/>
+              <a:alpha val="80000"/>
+            </a:schemeClr>
+          </a:solidFill>
+          <a:ln>
+            <a:noFill/>
+          </a:ln>
+          <a:effectLst>
+            <a:softEdge rad="31750"/>
+          </a:effectLst>
+        </p:spPr>
+        <p:style>
+          <a:lnRef idx="2">
+            <a:schemeClr val="accent1">
+              <a:shade val="50000"/>
+            </a:schemeClr>
+          </a:lnRef>
+          <a:fillRef idx="1">
+            <a:schemeClr val="accent1"/>
+          </a:fillRef>
+          <a:effectRef idx="0">
+            <a:schemeClr val="accent1"/>
+          </a:effectRef>
+          <a:fontRef idx="minor">
+            <a:schemeClr val="lt1"/>
           </a:fontRef>
         </p:style>
         <p:txBody>

</xml_diff>